<commit_message>
Oh I forgot to save
</commit_message>
<xml_diff>
--- a/lab-guide.pptx
+++ b/lab-guide.pptx
@@ -5,10 +5,10 @@
     <p:sldMasterId id="2147483678" r:id="rId1"/>
   </p:sldMasterIdLst>
   <p:notesMasterIdLst>
-    <p:notesMasterId r:id="rId19"/>
+    <p:notesMasterId r:id="rId22"/>
   </p:notesMasterIdLst>
   <p:handoutMasterIdLst>
-    <p:handoutMasterId r:id="rId20"/>
+    <p:handoutMasterId r:id="rId23"/>
   </p:handoutMasterIdLst>
   <p:sldIdLst>
     <p:sldId id="494" r:id="rId2"/>
@@ -17,17 +17,20 @@
     <p:sldId id="526" r:id="rId5"/>
     <p:sldId id="527" r:id="rId6"/>
     <p:sldId id="528" r:id="rId7"/>
-    <p:sldId id="511" r:id="rId8"/>
-    <p:sldId id="513" r:id="rId9"/>
-    <p:sldId id="514" r:id="rId10"/>
-    <p:sldId id="515" r:id="rId11"/>
-    <p:sldId id="517" r:id="rId12"/>
-    <p:sldId id="519" r:id="rId13"/>
-    <p:sldId id="520" r:id="rId14"/>
-    <p:sldId id="521" r:id="rId15"/>
-    <p:sldId id="522" r:id="rId16"/>
-    <p:sldId id="529" r:id="rId17"/>
-    <p:sldId id="535" r:id="rId18"/>
+    <p:sldId id="536" r:id="rId8"/>
+    <p:sldId id="541" r:id="rId9"/>
+    <p:sldId id="540" r:id="rId10"/>
+    <p:sldId id="511" r:id="rId11"/>
+    <p:sldId id="513" r:id="rId12"/>
+    <p:sldId id="514" r:id="rId13"/>
+    <p:sldId id="515" r:id="rId14"/>
+    <p:sldId id="517" r:id="rId15"/>
+    <p:sldId id="519" r:id="rId16"/>
+    <p:sldId id="520" r:id="rId17"/>
+    <p:sldId id="521" r:id="rId18"/>
+    <p:sldId id="522" r:id="rId19"/>
+    <p:sldId id="529" r:id="rId20"/>
+    <p:sldId id="535" r:id="rId21"/>
   </p:sldIdLst>
   <p:sldSz cx="12192000" cy="6858000"/>
   <p:notesSz cx="6858000" cy="9144000"/>
@@ -251,7 +254,7 @@
           <a:p>
             <a:fld id="{FCBF77B6-06AB-43A3-89A4-8CD1677993D0}" type="datetimeFigureOut">
               <a:rPr lang="en-CA" smtClean="0"/>
-              <a:t>2018-10-06</a:t>
+              <a:t>2019-09-09</a:t>
             </a:fld>
             <a:endParaRPr lang="en-CA"/>
           </a:p>
@@ -458,7 +461,7 @@
           <a:p>
             <a:fld id="{9B6804B0-AD37-4623-8498-3C9AE39E25E5}" type="datetimeFigureOut">
               <a:rPr lang="en-CA" smtClean="0"/>
-              <a:t>2018-10-06</a:t>
+              <a:t>2019-09-09</a:t>
             </a:fld>
             <a:endParaRPr lang="en-CA"/>
           </a:p>
@@ -3822,7 +3825,7 @@
           <a:graphicData uri="http://schemas.openxmlformats.org/presentationml/2006/ole">
             <mc:AlternateContent xmlns:mc="http://schemas.openxmlformats.org/markup-compatibility/2006">
               <mc:Choice xmlns:v="urn:schemas-microsoft-com:vml" Requires="v">
-                <p:oleObj spid="_x0000_s2188" name="think-cell Slide" r:id="rId4" imgW="270" imgH="270" progId="TCLayout.ActiveDocument.1">
+                <p:oleObj spid="_x0000_s2190" name="think-cell Slide" r:id="rId4" imgW="270" imgH="270" progId="TCLayout.ActiveDocument.1">
                   <p:embed/>
                 </p:oleObj>
               </mc:Choice>
@@ -6987,7 +6990,7 @@
                   <a:schemeClr val="bg1"/>
                 </a:solidFill>
               </a:rPr>
-              <a:t>Alex Kelly</a:t>
+              <a:t>Alex Kelly &amp; Simmigon Flagg</a:t>
             </a:r>
             <a:br>
               <a:rPr lang="en-US" dirty="0">
@@ -7039,79 +7042,111 @@
       </p:grpSpPr>
       <p:sp>
         <p:nvSpPr>
-          <p:cNvPr id="2" name="Title 1">
-            <a:extLst>
-              <a:ext uri="{FF2B5EF4-FFF2-40B4-BE49-F238E27FC236}">
-                <a16:creationId xmlns:a16="http://schemas.microsoft.com/office/drawing/2014/main" id="{F50010C0-7366-3745-9EC6-6D00C60E687B}"/>
-              </a:ext>
-            </a:extLst>
-          </p:cNvPr>
+          <p:cNvPr id="3" name="Slide Number Placeholder 2"/>
           <p:cNvSpPr>
             <a:spLocks noGrp="1"/>
           </p:cNvSpPr>
           <p:nvPr>
-            <p:ph type="title"/>
+            <p:ph type="sldNum" sz="quarter" idx="12"/>
           </p:nvPr>
         </p:nvSpPr>
-        <p:spPr/>
+        <p:spPr>
+          <a:xfrm>
+            <a:off x="11413998" y="6475080"/>
+            <a:ext cx="329636" cy="182880"/>
+          </a:xfrm>
+        </p:spPr>
         <p:txBody>
           <a:bodyPr/>
           <a:lstStyle/>
           <a:p>
-            <a:r>
-              <a:rPr lang="en-US" dirty="0" err="1"/>
-              <a:t>hello_world.ino</a:t>
-            </a:r>
-            <a:endParaRPr lang="en-US" dirty="0"/>
-          </a:p>
-        </p:txBody>
-      </p:sp>
-      <p:sp>
-        <p:nvSpPr>
-          <p:cNvPr id="3" name="Content Placeholder 2">
+            <a:fld id="{00E6A5BD-C011-4A45-AA3A-201790FB7F2B}" type="slidenum">
+              <a:rPr lang="en-CA" smtClean="0"/>
+              <a:pPr/>
+              <a:t>10</a:t>
+            </a:fld>
+            <a:endParaRPr lang="en-CA"/>
+          </a:p>
+        </p:txBody>
+      </p:sp>
+      <p:sp>
+        <p:nvSpPr>
+          <p:cNvPr id="10" name="Rectangle 9">
             <a:extLst>
               <a:ext uri="{FF2B5EF4-FFF2-40B4-BE49-F238E27FC236}">
-                <a16:creationId xmlns:a16="http://schemas.microsoft.com/office/drawing/2014/main" id="{F10BEE8A-9F6B-F44C-9F49-2B6B5AE77E3B}"/>
+                <a16:creationId xmlns:a16="http://schemas.microsoft.com/office/drawing/2014/main" id="{0B067B62-D23E-864B-9E5B-4D924BB9B5A2}"/>
               </a:ext>
             </a:extLst>
           </p:cNvPr>
-          <p:cNvSpPr>
-            <a:spLocks noGrp="1"/>
-          </p:cNvSpPr>
-          <p:nvPr>
-            <p:ph idx="1"/>
-          </p:nvPr>
-        </p:nvSpPr>
-        <p:spPr/>
-        <p:txBody>
-          <a:bodyPr/>
+          <p:cNvSpPr/>
+          <p:nvPr/>
+        </p:nvSpPr>
+        <p:spPr>
+          <a:xfrm>
+            <a:off x="533767" y="863269"/>
+            <a:ext cx="11209867" cy="6247864"/>
+          </a:xfrm>
+          <a:prstGeom prst="rect">
+            <a:avLst/>
+          </a:prstGeom>
+        </p:spPr>
+        <p:txBody>
+          <a:bodyPr wrap="square">
+            <a:spAutoFit/>
+          </a:bodyPr>
           <a:lstStyle/>
           <a:p>
             <a:r>
-              <a:rPr lang="en-US" dirty="0"/>
-              <a:t>Once you have </a:t>
-            </a:r>
-            <a:r>
-              <a:rPr lang="en-US" dirty="0" err="1"/>
-              <a:t>hello_world</a:t>
-            </a:r>
-            <a:r>
-              <a:rPr lang="en-US" dirty="0"/>
-              <a:t> running, you should be able to type a character and have your Arduino respond.  If it doesn’t, please see me before we continue!</a:t>
-            </a:r>
-          </a:p>
-          <a:p>
-            <a:endParaRPr lang="en-US" dirty="0"/>
-          </a:p>
-          <a:p>
-            <a:endParaRPr lang="en-US" dirty="0"/>
+              <a:rPr lang="en-US" sz="4000" dirty="0"/>
+              <a:t>git clone </a:t>
+            </a:r>
+            <a:r>
+              <a:rPr lang="en-US" sz="4000" dirty="0">
+                <a:hlinkClick r:id="rId2"/>
+              </a:rPr>
+              <a:t>https://github.com/pilotdeveloper/iot_lab.git</a:t>
+            </a:r>
+            <a:endParaRPr lang="en-US" sz="4000" dirty="0"/>
+          </a:p>
+          <a:p>
+            <a:endParaRPr lang="en-US" sz="4000" dirty="0"/>
+          </a:p>
+          <a:p>
+            <a:r>
+              <a:rPr lang="en-US" sz="4000" dirty="0"/>
+              <a:t>Mac users:  </a:t>
+            </a:r>
+          </a:p>
+          <a:p>
+            <a:br>
+              <a:rPr lang="en-US" sz="4000" dirty="0"/>
+            </a:br>
+            <a:r>
+              <a:rPr lang="en-US" sz="4000" dirty="0"/>
+              <a:t>Try this solution:</a:t>
+            </a:r>
+          </a:p>
+          <a:p>
+            <a:r>
+              <a:rPr lang="en-US" sz="4000" dirty="0">
+                <a:hlinkClick r:id="rId3"/>
+              </a:rPr>
+              <a:t>https://medium.com/@tony92151/arduino-ch340-chip-driver-for-high-sierra-39e621dae1e4</a:t>
+            </a:r>
+            <a:endParaRPr lang="en-US" sz="4000" dirty="0"/>
+          </a:p>
+          <a:p>
+            <a:endParaRPr lang="en-US" sz="4000" dirty="0"/>
+          </a:p>
+          <a:p>
+            <a:endParaRPr lang="en-US" sz="4000" dirty="0"/>
           </a:p>
         </p:txBody>
       </p:sp>
     </p:spTree>
     <p:extLst>
       <p:ext uri="{BB962C8B-B14F-4D97-AF65-F5344CB8AC3E}">
-        <p14:creationId xmlns:p14="http://schemas.microsoft.com/office/powerpoint/2010/main" val="3020462935"/>
+        <p14:creationId xmlns:p14="http://schemas.microsoft.com/office/powerpoint/2010/main" val="1449033653"/>
       </p:ext>
     </p:extLst>
   </p:cSld>
@@ -7140,6 +7175,375 @@
       </p:grpSpPr>
       <p:sp>
         <p:nvSpPr>
+          <p:cNvPr id="2" name="Title 1"/>
+          <p:cNvSpPr>
+            <a:spLocks noGrp="1"/>
+          </p:cNvSpPr>
+          <p:nvPr>
+            <p:ph type="title"/>
+          </p:nvPr>
+        </p:nvSpPr>
+        <p:spPr/>
+        <p:txBody>
+          <a:bodyPr/>
+          <a:lstStyle/>
+          <a:p>
+            <a:r>
+              <a:rPr lang="en-US" dirty="0"/>
+              <a:t>ENSURE YOUR BAG HAS</a:t>
+            </a:r>
+          </a:p>
+        </p:txBody>
+      </p:sp>
+      <p:sp>
+        <p:nvSpPr>
+          <p:cNvPr id="3" name="Content Placeholder 2"/>
+          <p:cNvSpPr>
+            <a:spLocks noGrp="1"/>
+          </p:cNvSpPr>
+          <p:nvPr>
+            <p:ph idx="1"/>
+          </p:nvPr>
+        </p:nvSpPr>
+        <p:spPr>
+          <a:xfrm>
+            <a:off x="533400" y="1136486"/>
+            <a:ext cx="10132616" cy="4837973"/>
+          </a:xfrm>
+        </p:spPr>
+        <p:txBody>
+          <a:bodyPr/>
+          <a:lstStyle/>
+          <a:p>
+            <a:r>
+              <a:rPr lang="en-US" sz="2400" dirty="0"/>
+              <a:t>8 male to female jumper cables</a:t>
+            </a:r>
+          </a:p>
+          <a:p>
+            <a:r>
+              <a:rPr lang="en-US" sz="2400" dirty="0"/>
+              <a:t>10 male to male jumper cables</a:t>
+            </a:r>
+          </a:p>
+          <a:p>
+            <a:r>
+              <a:rPr lang="en-US" sz="2400" dirty="0"/>
+              <a:t>10 µf electrolytic capacitor</a:t>
+            </a:r>
+          </a:p>
+          <a:p>
+            <a:r>
+              <a:rPr lang="en-US" sz="2400" dirty="0"/>
+              <a:t>1x NRF24L01+ Transceiver</a:t>
+            </a:r>
+          </a:p>
+          <a:p>
+            <a:r>
+              <a:rPr lang="en-US" sz="2400" dirty="0"/>
+              <a:t>4 tactical buttons</a:t>
+            </a:r>
+          </a:p>
+          <a:p>
+            <a:r>
+              <a:rPr lang="en-US" sz="2400" dirty="0"/>
+              <a:t>Arduino</a:t>
+            </a:r>
+          </a:p>
+          <a:p>
+            <a:r>
+              <a:rPr lang="en-US" sz="2400" dirty="0"/>
+              <a:t>Breadboard</a:t>
+            </a:r>
+          </a:p>
+          <a:p>
+            <a:r>
+              <a:rPr lang="en-US" sz="2400" dirty="0"/>
+              <a:t>USB Cable</a:t>
+            </a:r>
+          </a:p>
+          <a:p>
+            <a:endParaRPr lang="en-US" sz="2400" dirty="0"/>
+          </a:p>
+        </p:txBody>
+      </p:sp>
+    </p:spTree>
+    <p:extLst>
+      <p:ext uri="{BB962C8B-B14F-4D97-AF65-F5344CB8AC3E}">
+        <p14:creationId xmlns:p14="http://schemas.microsoft.com/office/powerpoint/2010/main" val="1350419827"/>
+      </p:ext>
+    </p:extLst>
+  </p:cSld>
+  <p:clrMapOvr>
+    <a:masterClrMapping/>
+  </p:clrMapOvr>
+</p:sld>
+</file>
+
+<file path=ppt/slides/slide12.xml><?xml version="1.0" encoding="utf-8"?>
+<p:sld xmlns:a="http://schemas.openxmlformats.org/drawingml/2006/main" xmlns:r="http://schemas.openxmlformats.org/officeDocument/2006/relationships" xmlns:p="http://schemas.openxmlformats.org/presentationml/2006/main">
+  <p:cSld>
+    <p:spTree>
+      <p:nvGrpSpPr>
+        <p:cNvPr id="1" name=""/>
+        <p:cNvGrpSpPr/>
+        <p:nvPr/>
+      </p:nvGrpSpPr>
+      <p:grpSpPr>
+        <a:xfrm>
+          <a:off x="0" y="0"/>
+          <a:ext cx="0" cy="0"/>
+          <a:chOff x="0" y="0"/>
+          <a:chExt cx="0" cy="0"/>
+        </a:xfrm>
+      </p:grpSpPr>
+      <p:sp>
+        <p:nvSpPr>
+          <p:cNvPr id="2" name="Title 1"/>
+          <p:cNvSpPr>
+            <a:spLocks noGrp="1"/>
+          </p:cNvSpPr>
+          <p:nvPr>
+            <p:ph type="title"/>
+          </p:nvPr>
+        </p:nvSpPr>
+        <p:spPr/>
+        <p:txBody>
+          <a:bodyPr/>
+          <a:lstStyle/>
+          <a:p>
+            <a:r>
+              <a:rPr lang="en-US" dirty="0"/>
+              <a:t>Test your board</a:t>
+            </a:r>
+          </a:p>
+        </p:txBody>
+      </p:sp>
+      <p:sp>
+        <p:nvSpPr>
+          <p:cNvPr id="3" name="Content Placeholder 2"/>
+          <p:cNvSpPr>
+            <a:spLocks noGrp="1"/>
+          </p:cNvSpPr>
+          <p:nvPr>
+            <p:ph idx="1"/>
+          </p:nvPr>
+        </p:nvSpPr>
+        <p:spPr/>
+        <p:txBody>
+          <a:bodyPr/>
+          <a:lstStyle/>
+          <a:p>
+            <a:r>
+              <a:rPr lang="en-US" sz="2400" dirty="0"/>
+              <a:t>Open the Arduino IDE</a:t>
+            </a:r>
+          </a:p>
+          <a:p>
+            <a:r>
+              <a:rPr lang="en-US" sz="2400" dirty="0"/>
+              <a:t>Select Tools, Click Board -&gt; Arduino Nano</a:t>
+            </a:r>
+          </a:p>
+          <a:p>
+            <a:r>
+              <a:rPr lang="en-US" sz="2400" dirty="0"/>
+              <a:t>Take note of the current devices under Tools -&gt; Port (write down so you don’t select them later)</a:t>
+            </a:r>
+          </a:p>
+          <a:p>
+            <a:r>
+              <a:rPr lang="en-US" sz="2400" dirty="0"/>
+              <a:t>Plug your Arduino in, wait about 20 seconds, and then check under Tools -&gt; Port.  </a:t>
+            </a:r>
+          </a:p>
+          <a:p>
+            <a:pPr marL="534924" lvl="3" indent="-342900"/>
+            <a:r>
+              <a:rPr lang="en-US" b="1" dirty="0"/>
+              <a:t>	</a:t>
+            </a:r>
+            <a:r>
+              <a:rPr lang="en-US" dirty="0"/>
+              <a:t>Windows – should show as a COM# device</a:t>
+            </a:r>
+          </a:p>
+          <a:p>
+            <a:pPr marL="534924" lvl="3" indent="-342900"/>
+            <a:r>
+              <a:rPr lang="en-US" dirty="0"/>
+              <a:t>	Mac Users – check the file called “</a:t>
+            </a:r>
+            <a:r>
+              <a:rPr lang="en-US" dirty="0" err="1"/>
+              <a:t>mac_help.txt</a:t>
+            </a:r>
+            <a:r>
+              <a:rPr lang="en-US" dirty="0"/>
+              <a:t>” in the repo.</a:t>
+            </a:r>
+          </a:p>
+          <a:p>
+            <a:r>
+              <a:rPr lang="en-US" sz="2400" dirty="0"/>
+              <a:t>Open the file </a:t>
+            </a:r>
+            <a:r>
+              <a:rPr lang="en-US" sz="2400" dirty="0" err="1"/>
+              <a:t>helloworld</a:t>
+            </a:r>
+            <a:r>
+              <a:rPr lang="en-US" sz="2400" dirty="0"/>
+              <a:t>/</a:t>
+            </a:r>
+            <a:r>
+              <a:rPr lang="en-US" sz="2400" dirty="0" err="1"/>
+              <a:t>helloworld.ino</a:t>
+            </a:r>
+            <a:r>
+              <a:rPr lang="en-US" sz="2400" dirty="0"/>
+              <a:t> and click the run button in Arduino</a:t>
+            </a:r>
+          </a:p>
+          <a:p>
+            <a:pPr lvl="1"/>
+            <a:endParaRPr lang="en-US" sz="2400" dirty="0"/>
+          </a:p>
+        </p:txBody>
+      </p:sp>
+    </p:spTree>
+    <p:extLst>
+      <p:ext uri="{BB962C8B-B14F-4D97-AF65-F5344CB8AC3E}">
+        <p14:creationId xmlns:p14="http://schemas.microsoft.com/office/powerpoint/2010/main" val="2066430322"/>
+      </p:ext>
+    </p:extLst>
+  </p:cSld>
+  <p:clrMapOvr>
+    <a:masterClrMapping/>
+  </p:clrMapOvr>
+</p:sld>
+</file>
+
+<file path=ppt/slides/slide13.xml><?xml version="1.0" encoding="utf-8"?>
+<p:sld xmlns:a="http://schemas.openxmlformats.org/drawingml/2006/main" xmlns:r="http://schemas.openxmlformats.org/officeDocument/2006/relationships" xmlns:p="http://schemas.openxmlformats.org/presentationml/2006/main">
+  <p:cSld>
+    <p:spTree>
+      <p:nvGrpSpPr>
+        <p:cNvPr id="1" name=""/>
+        <p:cNvGrpSpPr/>
+        <p:nvPr/>
+      </p:nvGrpSpPr>
+      <p:grpSpPr>
+        <a:xfrm>
+          <a:off x="0" y="0"/>
+          <a:ext cx="0" cy="0"/>
+          <a:chOff x="0" y="0"/>
+          <a:chExt cx="0" cy="0"/>
+        </a:xfrm>
+      </p:grpSpPr>
+      <p:sp>
+        <p:nvSpPr>
+          <p:cNvPr id="2" name="Title 1">
+            <a:extLst>
+              <a:ext uri="{FF2B5EF4-FFF2-40B4-BE49-F238E27FC236}">
+                <a16:creationId xmlns:a16="http://schemas.microsoft.com/office/drawing/2014/main" id="{F50010C0-7366-3745-9EC6-6D00C60E687B}"/>
+              </a:ext>
+            </a:extLst>
+          </p:cNvPr>
+          <p:cNvSpPr>
+            <a:spLocks noGrp="1"/>
+          </p:cNvSpPr>
+          <p:nvPr>
+            <p:ph type="title"/>
+          </p:nvPr>
+        </p:nvSpPr>
+        <p:spPr/>
+        <p:txBody>
+          <a:bodyPr/>
+          <a:lstStyle/>
+          <a:p>
+            <a:r>
+              <a:rPr lang="en-US" dirty="0" err="1"/>
+              <a:t>hello_world.ino</a:t>
+            </a:r>
+            <a:endParaRPr lang="en-US" dirty="0"/>
+          </a:p>
+        </p:txBody>
+      </p:sp>
+      <p:sp>
+        <p:nvSpPr>
+          <p:cNvPr id="3" name="Content Placeholder 2">
+            <a:extLst>
+              <a:ext uri="{FF2B5EF4-FFF2-40B4-BE49-F238E27FC236}">
+                <a16:creationId xmlns:a16="http://schemas.microsoft.com/office/drawing/2014/main" id="{F10BEE8A-9F6B-F44C-9F49-2B6B5AE77E3B}"/>
+              </a:ext>
+            </a:extLst>
+          </p:cNvPr>
+          <p:cNvSpPr>
+            <a:spLocks noGrp="1"/>
+          </p:cNvSpPr>
+          <p:nvPr>
+            <p:ph idx="1"/>
+          </p:nvPr>
+        </p:nvSpPr>
+        <p:spPr/>
+        <p:txBody>
+          <a:bodyPr/>
+          <a:lstStyle/>
+          <a:p>
+            <a:r>
+              <a:rPr lang="en-US" dirty="0"/>
+              <a:t>Once you have </a:t>
+            </a:r>
+            <a:r>
+              <a:rPr lang="en-US" dirty="0" err="1"/>
+              <a:t>hello_world</a:t>
+            </a:r>
+            <a:r>
+              <a:rPr lang="en-US" dirty="0"/>
+              <a:t> running, you should be able to type a character and have your Arduino respond.  If it doesn’t, please see me before we continue!</a:t>
+            </a:r>
+          </a:p>
+          <a:p>
+            <a:endParaRPr lang="en-US" dirty="0"/>
+          </a:p>
+          <a:p>
+            <a:endParaRPr lang="en-US" dirty="0"/>
+          </a:p>
+        </p:txBody>
+      </p:sp>
+    </p:spTree>
+    <p:extLst>
+      <p:ext uri="{BB962C8B-B14F-4D97-AF65-F5344CB8AC3E}">
+        <p14:creationId xmlns:p14="http://schemas.microsoft.com/office/powerpoint/2010/main" val="3020462935"/>
+      </p:ext>
+    </p:extLst>
+  </p:cSld>
+  <p:clrMapOvr>
+    <a:masterClrMapping/>
+  </p:clrMapOvr>
+</p:sld>
+</file>
+
+<file path=ppt/slides/slide14.xml><?xml version="1.0" encoding="utf-8"?>
+<p:sld xmlns:a="http://schemas.openxmlformats.org/drawingml/2006/main" xmlns:r="http://schemas.openxmlformats.org/officeDocument/2006/relationships" xmlns:p="http://schemas.openxmlformats.org/presentationml/2006/main">
+  <p:cSld>
+    <p:spTree>
+      <p:nvGrpSpPr>
+        <p:cNvPr id="1" name=""/>
+        <p:cNvGrpSpPr/>
+        <p:nvPr/>
+      </p:nvGrpSpPr>
+      <p:grpSpPr>
+        <a:xfrm>
+          <a:off x="0" y="0"/>
+          <a:ext cx="0" cy="0"/>
+          <a:chOff x="0" y="0"/>
+          <a:chExt cx="0" cy="0"/>
+        </a:xfrm>
+      </p:grpSpPr>
+      <p:sp>
+        <p:nvSpPr>
           <p:cNvPr id="2" name="Title 1">
             <a:extLst>
               <a:ext uri="{FF2B5EF4-FFF2-40B4-BE49-F238E27FC236}">
@@ -7240,7 +7644,7 @@
 </p:sld>
 </file>
 
-<file path=ppt/slides/slide12.xml><?xml version="1.0" encoding="utf-8"?>
+<file path=ppt/slides/slide15.xml><?xml version="1.0" encoding="utf-8"?>
 <p:sld xmlns:a="http://schemas.openxmlformats.org/drawingml/2006/main" xmlns:r="http://schemas.openxmlformats.org/officeDocument/2006/relationships" xmlns:p="http://schemas.openxmlformats.org/presentationml/2006/main">
   <p:cSld>
     <p:spTree>
@@ -7700,328 +8104,6 @@
 </p:sld>
 </file>
 
-<file path=ppt/slides/slide13.xml><?xml version="1.0" encoding="utf-8"?>
-<p:sld xmlns:a="http://schemas.openxmlformats.org/drawingml/2006/main" xmlns:r="http://schemas.openxmlformats.org/officeDocument/2006/relationships" xmlns:p="http://schemas.openxmlformats.org/presentationml/2006/main">
-  <p:cSld>
-    <p:spTree>
-      <p:nvGrpSpPr>
-        <p:cNvPr id="1" name=""/>
-        <p:cNvGrpSpPr/>
-        <p:nvPr/>
-      </p:nvGrpSpPr>
-      <p:grpSpPr>
-        <a:xfrm>
-          <a:off x="0" y="0"/>
-          <a:ext cx="0" cy="0"/>
-          <a:chOff x="0" y="0"/>
-          <a:chExt cx="0" cy="0"/>
-        </a:xfrm>
-      </p:grpSpPr>
-      <p:sp>
-        <p:nvSpPr>
-          <p:cNvPr id="2" name="Title 1">
-            <a:extLst>
-              <a:ext uri="{FF2B5EF4-FFF2-40B4-BE49-F238E27FC236}">
-                <a16:creationId xmlns:a16="http://schemas.microsoft.com/office/drawing/2014/main" id="{AD520C1D-50F7-4E43-A655-21A88C374FF7}"/>
-              </a:ext>
-            </a:extLst>
-          </p:cNvPr>
-          <p:cNvSpPr>
-            <a:spLocks noGrp="1"/>
-          </p:cNvSpPr>
-          <p:nvPr>
-            <p:ph type="title"/>
-          </p:nvPr>
-        </p:nvSpPr>
-        <p:spPr/>
-        <p:txBody>
-          <a:bodyPr/>
-          <a:lstStyle/>
-          <a:p>
-            <a:r>
-              <a:rPr lang="en-US" dirty="0"/>
-              <a:t>Capacitor</a:t>
-            </a:r>
-          </a:p>
-        </p:txBody>
-      </p:sp>
-      <p:sp>
-        <p:nvSpPr>
-          <p:cNvPr id="3" name="Content Placeholder 2">
-            <a:extLst>
-              <a:ext uri="{FF2B5EF4-FFF2-40B4-BE49-F238E27FC236}">
-                <a16:creationId xmlns:a16="http://schemas.microsoft.com/office/drawing/2014/main" id="{6220C2FB-BDD3-1D44-8921-B85F2F43A378}"/>
-              </a:ext>
-            </a:extLst>
-          </p:cNvPr>
-          <p:cNvSpPr>
-            <a:spLocks noGrp="1"/>
-          </p:cNvSpPr>
-          <p:nvPr>
-            <p:ph idx="1"/>
-          </p:nvPr>
-        </p:nvSpPr>
-        <p:spPr/>
-        <p:txBody>
-          <a:bodyPr/>
-          <a:lstStyle/>
-          <a:p>
-            <a:r>
-              <a:rPr lang="en-US" dirty="0"/>
-              <a:t>Bursting a signal requires a lot of energy – around 100 mA depending on the transmission strength.  The Arduino Mano is not capable of handling this burst over 3.3v, so you have to add a capacitor to account for the voltage drops. </a:t>
-            </a:r>
-          </a:p>
-          <a:p>
-            <a:r>
-              <a:rPr lang="en-US" dirty="0"/>
-              <a:t>The capacitor must be connected across 3.3v and Ground on your NRF24L01.  See photo in diagrams called “capacitor” for info on how to do this.</a:t>
-            </a:r>
-          </a:p>
-          <a:p>
-            <a:r>
-              <a:rPr lang="en-US" b="1" dirty="0"/>
-              <a:t>Be sure that the - - - (on the side of the capacitor) is on the ground side – you’ll short out the device if not!</a:t>
-            </a:r>
-          </a:p>
-          <a:p>
-            <a:endParaRPr lang="en-US" dirty="0"/>
-          </a:p>
-        </p:txBody>
-      </p:sp>
-    </p:spTree>
-    <p:extLst>
-      <p:ext uri="{BB962C8B-B14F-4D97-AF65-F5344CB8AC3E}">
-        <p14:creationId xmlns:p14="http://schemas.microsoft.com/office/powerpoint/2010/main" val="2850825567"/>
-      </p:ext>
-    </p:extLst>
-  </p:cSld>
-  <p:clrMapOvr>
-    <a:masterClrMapping/>
-  </p:clrMapOvr>
-</p:sld>
-</file>
-
-<file path=ppt/slides/slide14.xml><?xml version="1.0" encoding="utf-8"?>
-<p:sld xmlns:a="http://schemas.openxmlformats.org/drawingml/2006/main" xmlns:r="http://schemas.openxmlformats.org/officeDocument/2006/relationships" xmlns:p="http://schemas.openxmlformats.org/presentationml/2006/main">
-  <p:cSld>
-    <p:spTree>
-      <p:nvGrpSpPr>
-        <p:cNvPr id="1" name=""/>
-        <p:cNvGrpSpPr/>
-        <p:nvPr/>
-      </p:nvGrpSpPr>
-      <p:grpSpPr>
-        <a:xfrm>
-          <a:off x="0" y="0"/>
-          <a:ext cx="0" cy="0"/>
-          <a:chOff x="0" y="0"/>
-          <a:chExt cx="0" cy="0"/>
-        </a:xfrm>
-      </p:grpSpPr>
-      <p:sp>
-        <p:nvSpPr>
-          <p:cNvPr id="2" name="Title 1">
-            <a:extLst>
-              <a:ext uri="{FF2B5EF4-FFF2-40B4-BE49-F238E27FC236}">
-                <a16:creationId xmlns:a16="http://schemas.microsoft.com/office/drawing/2014/main" id="{F38AA60E-F1A4-B341-8418-AA355E912D67}"/>
-              </a:ext>
-            </a:extLst>
-          </p:cNvPr>
-          <p:cNvSpPr>
-            <a:spLocks noGrp="1"/>
-          </p:cNvSpPr>
-          <p:nvPr>
-            <p:ph type="title"/>
-          </p:nvPr>
-        </p:nvSpPr>
-        <p:spPr/>
-        <p:txBody>
-          <a:bodyPr/>
-          <a:lstStyle/>
-          <a:p>
-            <a:r>
-              <a:rPr lang="en-US" dirty="0"/>
-              <a:t>Tactical Switches</a:t>
-            </a:r>
-          </a:p>
-        </p:txBody>
-      </p:sp>
-      <p:sp>
-        <p:nvSpPr>
-          <p:cNvPr id="3" name="Content Placeholder 2">
-            <a:extLst>
-              <a:ext uri="{FF2B5EF4-FFF2-40B4-BE49-F238E27FC236}">
-                <a16:creationId xmlns:a16="http://schemas.microsoft.com/office/drawing/2014/main" id="{15AF0856-CD6C-F546-AFC9-359BAA15E7AE}"/>
-              </a:ext>
-            </a:extLst>
-          </p:cNvPr>
-          <p:cNvSpPr>
-            <a:spLocks noGrp="1"/>
-          </p:cNvSpPr>
-          <p:nvPr>
-            <p:ph idx="1"/>
-          </p:nvPr>
-        </p:nvSpPr>
-        <p:spPr/>
-        <p:txBody>
-          <a:bodyPr/>
-          <a:lstStyle/>
-          <a:p>
-            <a:endParaRPr lang="en-US" dirty="0"/>
-          </a:p>
-        </p:txBody>
-      </p:sp>
-      <p:pic>
-        <p:nvPicPr>
-          <p:cNvPr id="4" name="Picture 3">
-            <a:extLst>
-              <a:ext uri="{FF2B5EF4-FFF2-40B4-BE49-F238E27FC236}">
-                <a16:creationId xmlns:a16="http://schemas.microsoft.com/office/drawing/2014/main" id="{8BB03EA0-A71F-AC4A-AB6F-D0574ED68F13}"/>
-              </a:ext>
-            </a:extLst>
-          </p:cNvPr>
-          <p:cNvPicPr>
-            <a:picLocks noChangeAspect="1"/>
-          </p:cNvPicPr>
-          <p:nvPr/>
-        </p:nvPicPr>
-        <p:blipFill>
-          <a:blip r:embed="rId2"/>
-          <a:stretch>
-            <a:fillRect/>
-          </a:stretch>
-        </p:blipFill>
-        <p:spPr>
-          <a:xfrm>
-            <a:off x="695457" y="2377437"/>
-            <a:ext cx="9481670" cy="2467832"/>
-          </a:xfrm>
-          <a:prstGeom prst="rect">
-            <a:avLst/>
-          </a:prstGeom>
-        </p:spPr>
-      </p:pic>
-    </p:spTree>
-    <p:extLst>
-      <p:ext uri="{BB962C8B-B14F-4D97-AF65-F5344CB8AC3E}">
-        <p14:creationId xmlns:p14="http://schemas.microsoft.com/office/powerpoint/2010/main" val="2157600442"/>
-      </p:ext>
-    </p:extLst>
-  </p:cSld>
-  <p:clrMapOvr>
-    <a:masterClrMapping/>
-  </p:clrMapOvr>
-</p:sld>
-</file>
-
-<file path=ppt/slides/slide15.xml><?xml version="1.0" encoding="utf-8"?>
-<p:sld xmlns:a="http://schemas.openxmlformats.org/drawingml/2006/main" xmlns:r="http://schemas.openxmlformats.org/officeDocument/2006/relationships" xmlns:p="http://schemas.openxmlformats.org/presentationml/2006/main">
-  <p:cSld>
-    <p:spTree>
-      <p:nvGrpSpPr>
-        <p:cNvPr id="1" name=""/>
-        <p:cNvGrpSpPr/>
-        <p:nvPr/>
-      </p:nvGrpSpPr>
-      <p:grpSpPr>
-        <a:xfrm>
-          <a:off x="0" y="0"/>
-          <a:ext cx="0" cy="0"/>
-          <a:chOff x="0" y="0"/>
-          <a:chExt cx="0" cy="0"/>
-        </a:xfrm>
-      </p:grpSpPr>
-      <p:sp>
-        <p:nvSpPr>
-          <p:cNvPr id="3" name="Content Placeholder 2">
-            <a:extLst>
-              <a:ext uri="{FF2B5EF4-FFF2-40B4-BE49-F238E27FC236}">
-                <a16:creationId xmlns:a16="http://schemas.microsoft.com/office/drawing/2014/main" id="{37BDBFE5-9D52-D74B-8382-14297D463301}"/>
-              </a:ext>
-            </a:extLst>
-          </p:cNvPr>
-          <p:cNvSpPr>
-            <a:spLocks noGrp="1"/>
-          </p:cNvSpPr>
-          <p:nvPr>
-            <p:ph idx="1"/>
-          </p:nvPr>
-        </p:nvSpPr>
-        <p:spPr>
-          <a:xfrm>
-            <a:off x="533400" y="562328"/>
-            <a:ext cx="11141149" cy="4346825"/>
-          </a:xfrm>
-        </p:spPr>
-        <p:txBody>
-          <a:bodyPr/>
-          <a:lstStyle/>
-          <a:p>
-            <a:r>
-              <a:rPr lang="en-US" dirty="0"/>
-              <a:t>Connect GND to the Negative Rail (Blue </a:t>
-            </a:r>
-            <a:r>
-              <a:rPr lang="en-US" b="1" dirty="0"/>
-              <a:t>– </a:t>
-            </a:r>
-            <a:r>
-              <a:rPr lang="en-US" dirty="0"/>
-              <a:t>on either side)</a:t>
-            </a:r>
-          </a:p>
-          <a:p>
-            <a:r>
-              <a:rPr lang="en-US" dirty="0"/>
-              <a:t>Press your buttons in to the bread board, ensure AB are on left &amp; CD are on right </a:t>
-            </a:r>
-          </a:p>
-          <a:p>
-            <a:r>
-              <a:rPr lang="en-US" dirty="0"/>
-              <a:t>Connect the left side of the switches (A) to the Negative rail with four male to male jumper wires.</a:t>
-            </a:r>
-          </a:p>
-          <a:p>
-            <a:r>
-              <a:rPr lang="en-US" dirty="0"/>
-              <a:t>Connect the right side of the switch to D2, D3, D4, and D5 respectively</a:t>
-            </a:r>
-          </a:p>
-          <a:p>
-            <a:r>
-              <a:rPr lang="en-US" dirty="0"/>
-              <a:t>(see all images in </a:t>
-            </a:r>
-            <a:r>
-              <a:rPr lang="en-US" dirty="0" err="1"/>
-              <a:t>github</a:t>
-            </a:r>
-            <a:r>
-              <a:rPr lang="en-US" dirty="0"/>
-              <a:t> repository for </a:t>
-            </a:r>
-            <a:r>
-              <a:rPr lang="en-US"/>
-              <a:t>additional info)</a:t>
-            </a:r>
-            <a:endParaRPr lang="en-US" dirty="0"/>
-          </a:p>
-        </p:txBody>
-      </p:sp>
-    </p:spTree>
-    <p:extLst>
-      <p:ext uri="{BB962C8B-B14F-4D97-AF65-F5344CB8AC3E}">
-        <p14:creationId xmlns:p14="http://schemas.microsoft.com/office/powerpoint/2010/main" val="2328744426"/>
-      </p:ext>
-    </p:extLst>
-  </p:cSld>
-  <p:clrMapOvr>
-    <a:masterClrMapping/>
-  </p:clrMapOvr>
-</p:sld>
-</file>
-
 <file path=ppt/slides/slide16.xml><?xml version="1.0" encoding="utf-8"?>
 <p:sld xmlns:a="http://schemas.openxmlformats.org/drawingml/2006/main" xmlns:r="http://schemas.openxmlformats.org/officeDocument/2006/relationships" xmlns:p="http://schemas.openxmlformats.org/presentationml/2006/main">
   <p:cSld>
@@ -8044,7 +8126,7 @@
           <p:cNvPr id="2" name="Title 1">
             <a:extLst>
               <a:ext uri="{FF2B5EF4-FFF2-40B4-BE49-F238E27FC236}">
-                <a16:creationId xmlns:a16="http://schemas.microsoft.com/office/drawing/2014/main" id="{3F40B394-692A-45F3-877D-FF21D4A59424}"/>
+                <a16:creationId xmlns:a16="http://schemas.microsoft.com/office/drawing/2014/main" id="{AD520C1D-50F7-4E43-A655-21A88C374FF7}"/>
               </a:ext>
             </a:extLst>
           </p:cNvPr>
@@ -8062,7 +8144,7 @@
           <a:p>
             <a:r>
               <a:rPr lang="en-US" dirty="0"/>
-              <a:t>Program your board</a:t>
+              <a:t>Capacitor</a:t>
             </a:r>
           </a:p>
         </p:txBody>
@@ -8072,7 +8154,7 @@
           <p:cNvPr id="3" name="Content Placeholder 2">
             <a:extLst>
               <a:ext uri="{FF2B5EF4-FFF2-40B4-BE49-F238E27FC236}">
-                <a16:creationId xmlns:a16="http://schemas.microsoft.com/office/drawing/2014/main" id="{7FD22553-7140-4EAE-A673-8F37562BCE27}"/>
+                <a16:creationId xmlns:a16="http://schemas.microsoft.com/office/drawing/2014/main" id="{6220C2FB-BDD3-1D44-8921-B85F2F43A378}"/>
               </a:ext>
             </a:extLst>
           </p:cNvPr>
@@ -8090,43 +8172,30 @@
           <a:p>
             <a:r>
               <a:rPr lang="en-US" dirty="0"/>
-              <a:t>Open </a:t>
-            </a:r>
-            <a:r>
-              <a:rPr lang="en-US" dirty="0" err="1"/>
-              <a:t>Transmitter.ino</a:t>
-            </a:r>
+              <a:t>Bursting a signal requires a lot of energy – around 100 mA depending on the transmission strength.  The Arduino Mano is not capable of handling this burst over 3.3v, so you have to add a capacitor to account for the voltage drops. </a:t>
+            </a:r>
+          </a:p>
+          <a:p>
             <a:r>
               <a:rPr lang="en-US" dirty="0"/>
-              <a:t> and set your group number equal to </a:t>
-            </a:r>
-            <a:r>
-              <a:rPr lang="en-US" dirty="0" err="1"/>
-              <a:t>tableNumber</a:t>
-            </a:r>
-            <a:r>
-              <a:rPr lang="en-US" dirty="0"/>
-              <a:t>.</a:t>
-            </a:r>
-          </a:p>
-          <a:p>
-            <a:r>
-              <a:rPr lang="en-US" dirty="0"/>
-              <a:t>Fix the code!</a:t>
-            </a:r>
-          </a:p>
-          <a:p>
-            <a:r>
-              <a:rPr lang="en-US" dirty="0"/>
-              <a:t>Add NRF24 to your dependencies before you compile!!!</a:t>
-            </a:r>
+              <a:t>The capacitor must be connected across 3.3v and Ground on your NRF24L01.  See photo in diagrams called “capacitor” for info on how to do this.</a:t>
+            </a:r>
+          </a:p>
+          <a:p>
+            <a:r>
+              <a:rPr lang="en-US" b="1" dirty="0"/>
+              <a:t>Be sure that the - - - (on the side of the capacitor) is on the ground side – you’ll short out the device if not!</a:t>
+            </a:r>
+          </a:p>
+          <a:p>
+            <a:endParaRPr lang="en-US" dirty="0"/>
           </a:p>
         </p:txBody>
       </p:sp>
     </p:spTree>
     <p:extLst>
       <p:ext uri="{BB962C8B-B14F-4D97-AF65-F5344CB8AC3E}">
-        <p14:creationId xmlns:p14="http://schemas.microsoft.com/office/powerpoint/2010/main" val="2215537048"/>
+        <p14:creationId xmlns:p14="http://schemas.microsoft.com/office/powerpoint/2010/main" val="2850825567"/>
       </p:ext>
     </p:extLst>
   </p:cSld>
@@ -8158,7 +8227,7 @@
           <p:cNvPr id="2" name="Title 1">
             <a:extLst>
               <a:ext uri="{FF2B5EF4-FFF2-40B4-BE49-F238E27FC236}">
-                <a16:creationId xmlns:a16="http://schemas.microsoft.com/office/drawing/2014/main" id="{98D6C60A-0731-4E9D-82EF-4C2C3B1605C4}"/>
+                <a16:creationId xmlns:a16="http://schemas.microsoft.com/office/drawing/2014/main" id="{F38AA60E-F1A4-B341-8418-AA355E912D67}"/>
               </a:ext>
             </a:extLst>
           </p:cNvPr>
@@ -8176,7 +8245,7 @@
           <a:p>
             <a:r>
               <a:rPr lang="en-US" dirty="0"/>
-              <a:t>Connect with me!</a:t>
+              <a:t>Tactical Switches</a:t>
             </a:r>
           </a:p>
         </p:txBody>
@@ -8186,7 +8255,7 @@
           <p:cNvPr id="3" name="Content Placeholder 2">
             <a:extLst>
               <a:ext uri="{FF2B5EF4-FFF2-40B4-BE49-F238E27FC236}">
-                <a16:creationId xmlns:a16="http://schemas.microsoft.com/office/drawing/2014/main" id="{402CA226-6525-437B-88B4-0AD9A4B24A0E}"/>
+                <a16:creationId xmlns:a16="http://schemas.microsoft.com/office/drawing/2014/main" id="{15AF0856-CD6C-F546-AFC9-359BAA15E7AE}"/>
               </a:ext>
             </a:extLst>
           </p:cNvPr>
@@ -8202,32 +8271,266 @@
           <a:bodyPr/>
           <a:lstStyle/>
           <a:p>
-            <a:r>
-              <a:rPr lang="en-US" dirty="0">
-                <a:hlinkClick r:id="rId2"/>
-              </a:rPr>
-              <a:t>https://ajkelly.net</a:t>
-            </a:r>
             <a:endParaRPr lang="en-US" dirty="0"/>
           </a:p>
-          <a:p>
-            <a:r>
-              <a:rPr lang="en-US" dirty="0">
-                <a:hlinkClick r:id="rId3"/>
-              </a:rPr>
-              <a:t>https://linkedin.com/in/alexanderjkelly</a:t>
-            </a:r>
-            <a:endParaRPr lang="en-US" dirty="0"/>
-          </a:p>
-          <a:p>
-            <a:endParaRPr lang="en-US" dirty="0"/>
-          </a:p>
-        </p:txBody>
-      </p:sp>
+        </p:txBody>
+      </p:sp>
+      <p:pic>
+        <p:nvPicPr>
+          <p:cNvPr id="4" name="Picture 3">
+            <a:extLst>
+              <a:ext uri="{FF2B5EF4-FFF2-40B4-BE49-F238E27FC236}">
+                <a16:creationId xmlns:a16="http://schemas.microsoft.com/office/drawing/2014/main" id="{8BB03EA0-A71F-AC4A-AB6F-D0574ED68F13}"/>
+              </a:ext>
+            </a:extLst>
+          </p:cNvPr>
+          <p:cNvPicPr>
+            <a:picLocks noChangeAspect="1"/>
+          </p:cNvPicPr>
+          <p:nvPr/>
+        </p:nvPicPr>
+        <p:blipFill>
+          <a:blip r:embed="rId2"/>
+          <a:stretch>
+            <a:fillRect/>
+          </a:stretch>
+        </p:blipFill>
+        <p:spPr>
+          <a:xfrm>
+            <a:off x="695457" y="2377437"/>
+            <a:ext cx="9481670" cy="2467832"/>
+          </a:xfrm>
+          <a:prstGeom prst="rect">
+            <a:avLst/>
+          </a:prstGeom>
+        </p:spPr>
+      </p:pic>
     </p:spTree>
     <p:extLst>
       <p:ext uri="{BB962C8B-B14F-4D97-AF65-F5344CB8AC3E}">
-        <p14:creationId xmlns:p14="http://schemas.microsoft.com/office/powerpoint/2010/main" val="578060412"/>
+        <p14:creationId xmlns:p14="http://schemas.microsoft.com/office/powerpoint/2010/main" val="2157600442"/>
+      </p:ext>
+    </p:extLst>
+  </p:cSld>
+  <p:clrMapOvr>
+    <a:masterClrMapping/>
+  </p:clrMapOvr>
+</p:sld>
+</file>
+
+<file path=ppt/slides/slide18.xml><?xml version="1.0" encoding="utf-8"?>
+<p:sld xmlns:a="http://schemas.openxmlformats.org/drawingml/2006/main" xmlns:r="http://schemas.openxmlformats.org/officeDocument/2006/relationships" xmlns:p="http://schemas.openxmlformats.org/presentationml/2006/main">
+  <p:cSld>
+    <p:spTree>
+      <p:nvGrpSpPr>
+        <p:cNvPr id="1" name=""/>
+        <p:cNvGrpSpPr/>
+        <p:nvPr/>
+      </p:nvGrpSpPr>
+      <p:grpSpPr>
+        <a:xfrm>
+          <a:off x="0" y="0"/>
+          <a:ext cx="0" cy="0"/>
+          <a:chOff x="0" y="0"/>
+          <a:chExt cx="0" cy="0"/>
+        </a:xfrm>
+      </p:grpSpPr>
+      <p:sp>
+        <p:nvSpPr>
+          <p:cNvPr id="3" name="Content Placeholder 2">
+            <a:extLst>
+              <a:ext uri="{FF2B5EF4-FFF2-40B4-BE49-F238E27FC236}">
+                <a16:creationId xmlns:a16="http://schemas.microsoft.com/office/drawing/2014/main" id="{37BDBFE5-9D52-D74B-8382-14297D463301}"/>
+              </a:ext>
+            </a:extLst>
+          </p:cNvPr>
+          <p:cNvSpPr>
+            <a:spLocks noGrp="1"/>
+          </p:cNvSpPr>
+          <p:nvPr>
+            <p:ph idx="1"/>
+          </p:nvPr>
+        </p:nvSpPr>
+        <p:spPr>
+          <a:xfrm>
+            <a:off x="533400" y="562328"/>
+            <a:ext cx="11141149" cy="4346825"/>
+          </a:xfrm>
+        </p:spPr>
+        <p:txBody>
+          <a:bodyPr/>
+          <a:lstStyle/>
+          <a:p>
+            <a:r>
+              <a:rPr lang="en-US" dirty="0"/>
+              <a:t>Connect GND to the Negative Rail (Blue </a:t>
+            </a:r>
+            <a:r>
+              <a:rPr lang="en-US" b="1" dirty="0"/>
+              <a:t>– </a:t>
+            </a:r>
+            <a:r>
+              <a:rPr lang="en-US" dirty="0"/>
+              <a:t>on either side)</a:t>
+            </a:r>
+          </a:p>
+          <a:p>
+            <a:r>
+              <a:rPr lang="en-US" dirty="0"/>
+              <a:t>Press your buttons in to the bread board, ensure AB are on left &amp; CD are on right </a:t>
+            </a:r>
+          </a:p>
+          <a:p>
+            <a:r>
+              <a:rPr lang="en-US" dirty="0"/>
+              <a:t>Connect the left side of the switches (A) to the Negative rail with four male to male jumper wires.</a:t>
+            </a:r>
+          </a:p>
+          <a:p>
+            <a:r>
+              <a:rPr lang="en-US" dirty="0"/>
+              <a:t>Connect the right side of the switch to D2, D3, D4, and D5 respectively</a:t>
+            </a:r>
+          </a:p>
+          <a:p>
+            <a:r>
+              <a:rPr lang="en-US" dirty="0"/>
+              <a:t>(see all images in </a:t>
+            </a:r>
+            <a:r>
+              <a:rPr lang="en-US" dirty="0" err="1"/>
+              <a:t>github</a:t>
+            </a:r>
+            <a:r>
+              <a:rPr lang="en-US" dirty="0"/>
+              <a:t> repository for </a:t>
+            </a:r>
+            <a:r>
+              <a:rPr lang="en-US"/>
+              <a:t>additional info)</a:t>
+            </a:r>
+            <a:endParaRPr lang="en-US" dirty="0"/>
+          </a:p>
+        </p:txBody>
+      </p:sp>
+    </p:spTree>
+    <p:extLst>
+      <p:ext uri="{BB962C8B-B14F-4D97-AF65-F5344CB8AC3E}">
+        <p14:creationId xmlns:p14="http://schemas.microsoft.com/office/powerpoint/2010/main" val="2328744426"/>
+      </p:ext>
+    </p:extLst>
+  </p:cSld>
+  <p:clrMapOvr>
+    <a:masterClrMapping/>
+  </p:clrMapOvr>
+</p:sld>
+</file>
+
+<file path=ppt/slides/slide19.xml><?xml version="1.0" encoding="utf-8"?>
+<p:sld xmlns:a="http://schemas.openxmlformats.org/drawingml/2006/main" xmlns:r="http://schemas.openxmlformats.org/officeDocument/2006/relationships" xmlns:p="http://schemas.openxmlformats.org/presentationml/2006/main">
+  <p:cSld>
+    <p:spTree>
+      <p:nvGrpSpPr>
+        <p:cNvPr id="1" name=""/>
+        <p:cNvGrpSpPr/>
+        <p:nvPr/>
+      </p:nvGrpSpPr>
+      <p:grpSpPr>
+        <a:xfrm>
+          <a:off x="0" y="0"/>
+          <a:ext cx="0" cy="0"/>
+          <a:chOff x="0" y="0"/>
+          <a:chExt cx="0" cy="0"/>
+        </a:xfrm>
+      </p:grpSpPr>
+      <p:sp>
+        <p:nvSpPr>
+          <p:cNvPr id="2" name="Title 1">
+            <a:extLst>
+              <a:ext uri="{FF2B5EF4-FFF2-40B4-BE49-F238E27FC236}">
+                <a16:creationId xmlns:a16="http://schemas.microsoft.com/office/drawing/2014/main" id="{3F40B394-692A-45F3-877D-FF21D4A59424}"/>
+              </a:ext>
+            </a:extLst>
+          </p:cNvPr>
+          <p:cNvSpPr>
+            <a:spLocks noGrp="1"/>
+          </p:cNvSpPr>
+          <p:nvPr>
+            <p:ph type="title"/>
+          </p:nvPr>
+        </p:nvSpPr>
+        <p:spPr/>
+        <p:txBody>
+          <a:bodyPr/>
+          <a:lstStyle/>
+          <a:p>
+            <a:r>
+              <a:rPr lang="en-US" dirty="0"/>
+              <a:t>Program your board</a:t>
+            </a:r>
+          </a:p>
+        </p:txBody>
+      </p:sp>
+      <p:sp>
+        <p:nvSpPr>
+          <p:cNvPr id="3" name="Content Placeholder 2">
+            <a:extLst>
+              <a:ext uri="{FF2B5EF4-FFF2-40B4-BE49-F238E27FC236}">
+                <a16:creationId xmlns:a16="http://schemas.microsoft.com/office/drawing/2014/main" id="{7FD22553-7140-4EAE-A673-8F37562BCE27}"/>
+              </a:ext>
+            </a:extLst>
+          </p:cNvPr>
+          <p:cNvSpPr>
+            <a:spLocks noGrp="1"/>
+          </p:cNvSpPr>
+          <p:nvPr>
+            <p:ph idx="1"/>
+          </p:nvPr>
+        </p:nvSpPr>
+        <p:spPr/>
+        <p:txBody>
+          <a:bodyPr/>
+          <a:lstStyle/>
+          <a:p>
+            <a:r>
+              <a:rPr lang="en-US" dirty="0"/>
+              <a:t>Open </a:t>
+            </a:r>
+            <a:r>
+              <a:rPr lang="en-US" dirty="0" err="1"/>
+              <a:t>Transmitter.ino</a:t>
+            </a:r>
+            <a:r>
+              <a:rPr lang="en-US" dirty="0"/>
+              <a:t> and set your group number equal to </a:t>
+            </a:r>
+            <a:r>
+              <a:rPr lang="en-US" dirty="0" err="1"/>
+              <a:t>tableNumber</a:t>
+            </a:r>
+            <a:r>
+              <a:rPr lang="en-US" dirty="0"/>
+              <a:t>.</a:t>
+            </a:r>
+          </a:p>
+          <a:p>
+            <a:r>
+              <a:rPr lang="en-US" dirty="0"/>
+              <a:t>Fix the code!</a:t>
+            </a:r>
+          </a:p>
+          <a:p>
+            <a:r>
+              <a:rPr lang="en-US" dirty="0"/>
+              <a:t>Add NRF24 to your dependencies before you compile!!!</a:t>
+            </a:r>
+          </a:p>
+        </p:txBody>
+      </p:sp>
+    </p:spTree>
+    <p:extLst>
+      <p:ext uri="{BB962C8B-B14F-4D97-AF65-F5344CB8AC3E}">
+        <p14:creationId xmlns:p14="http://schemas.microsoft.com/office/powerpoint/2010/main" val="2215537048"/>
       </p:ext>
     </p:extLst>
   </p:cSld>
@@ -8480,6 +8783,107 @@
 </p:sld>
 </file>
 
+<file path=ppt/slides/slide20.xml><?xml version="1.0" encoding="utf-8"?>
+<p:sld xmlns:a="http://schemas.openxmlformats.org/drawingml/2006/main" xmlns:r="http://schemas.openxmlformats.org/officeDocument/2006/relationships" xmlns:p="http://schemas.openxmlformats.org/presentationml/2006/main">
+  <p:cSld>
+    <p:spTree>
+      <p:nvGrpSpPr>
+        <p:cNvPr id="1" name=""/>
+        <p:cNvGrpSpPr/>
+        <p:nvPr/>
+      </p:nvGrpSpPr>
+      <p:grpSpPr>
+        <a:xfrm>
+          <a:off x="0" y="0"/>
+          <a:ext cx="0" cy="0"/>
+          <a:chOff x="0" y="0"/>
+          <a:chExt cx="0" cy="0"/>
+        </a:xfrm>
+      </p:grpSpPr>
+      <p:sp>
+        <p:nvSpPr>
+          <p:cNvPr id="2" name="Title 1">
+            <a:extLst>
+              <a:ext uri="{FF2B5EF4-FFF2-40B4-BE49-F238E27FC236}">
+                <a16:creationId xmlns:a16="http://schemas.microsoft.com/office/drawing/2014/main" id="{98D6C60A-0731-4E9D-82EF-4C2C3B1605C4}"/>
+              </a:ext>
+            </a:extLst>
+          </p:cNvPr>
+          <p:cNvSpPr>
+            <a:spLocks noGrp="1"/>
+          </p:cNvSpPr>
+          <p:nvPr>
+            <p:ph type="title"/>
+          </p:nvPr>
+        </p:nvSpPr>
+        <p:spPr/>
+        <p:txBody>
+          <a:bodyPr/>
+          <a:lstStyle/>
+          <a:p>
+            <a:r>
+              <a:rPr lang="en-US" dirty="0"/>
+              <a:t>Connect with me!</a:t>
+            </a:r>
+          </a:p>
+        </p:txBody>
+      </p:sp>
+      <p:sp>
+        <p:nvSpPr>
+          <p:cNvPr id="3" name="Content Placeholder 2">
+            <a:extLst>
+              <a:ext uri="{FF2B5EF4-FFF2-40B4-BE49-F238E27FC236}">
+                <a16:creationId xmlns:a16="http://schemas.microsoft.com/office/drawing/2014/main" id="{402CA226-6525-437B-88B4-0AD9A4B24A0E}"/>
+              </a:ext>
+            </a:extLst>
+          </p:cNvPr>
+          <p:cNvSpPr>
+            <a:spLocks noGrp="1"/>
+          </p:cNvSpPr>
+          <p:nvPr>
+            <p:ph idx="1"/>
+          </p:nvPr>
+        </p:nvSpPr>
+        <p:spPr/>
+        <p:txBody>
+          <a:bodyPr/>
+          <a:lstStyle/>
+          <a:p>
+            <a:r>
+              <a:rPr lang="en-US" dirty="0">
+                <a:hlinkClick r:id="rId2"/>
+              </a:rPr>
+              <a:t>https://ajkelly.net</a:t>
+            </a:r>
+            <a:endParaRPr lang="en-US" dirty="0"/>
+          </a:p>
+          <a:p>
+            <a:r>
+              <a:rPr lang="en-US" dirty="0">
+                <a:hlinkClick r:id="rId3"/>
+              </a:rPr>
+              <a:t>https://linkedin.com/in/alexanderjkelly</a:t>
+            </a:r>
+            <a:endParaRPr lang="en-US" dirty="0"/>
+          </a:p>
+          <a:p>
+            <a:endParaRPr lang="en-US" dirty="0"/>
+          </a:p>
+        </p:txBody>
+      </p:sp>
+    </p:spTree>
+    <p:extLst>
+      <p:ext uri="{BB962C8B-B14F-4D97-AF65-F5344CB8AC3E}">
+        <p14:creationId xmlns:p14="http://schemas.microsoft.com/office/powerpoint/2010/main" val="578060412"/>
+      </p:ext>
+    </p:extLst>
+  </p:cSld>
+  <p:clrMapOvr>
+    <a:masterClrMapping/>
+  </p:clrMapOvr>
+</p:sld>
+</file>
+
 <file path=ppt/slides/slide3.xml><?xml version="1.0" encoding="utf-8"?>
 <p:sld xmlns:a="http://schemas.openxmlformats.org/drawingml/2006/main" xmlns:r="http://schemas.openxmlformats.org/officeDocument/2006/relationships" xmlns:p="http://schemas.openxmlformats.org/presentationml/2006/main">
   <p:cSld>
@@ -8991,111 +9395,223 @@
       </p:grpSpPr>
       <p:sp>
         <p:nvSpPr>
-          <p:cNvPr id="3" name="Slide Number Placeholder 2"/>
+          <p:cNvPr id="3" name="Title 2">
+            <a:extLst>
+              <a:ext uri="{FF2B5EF4-FFF2-40B4-BE49-F238E27FC236}">
+                <a16:creationId xmlns:a16="http://schemas.microsoft.com/office/drawing/2014/main" id="{FDF58119-C7C8-4236-B437-7333A1D7FF5C}"/>
+              </a:ext>
+            </a:extLst>
+          </p:cNvPr>
           <p:cNvSpPr>
             <a:spLocks noGrp="1"/>
           </p:cNvSpPr>
           <p:nvPr>
-            <p:ph type="sldNum" sz="quarter" idx="12"/>
+            <p:ph type="title"/>
           </p:nvPr>
         </p:nvSpPr>
         <p:spPr>
           <a:xfrm>
-            <a:off x="11413998" y="6475080"/>
-            <a:ext cx="329636" cy="182880"/>
+            <a:off x="533400" y="222086"/>
+            <a:ext cx="10091484" cy="914400"/>
           </a:xfrm>
         </p:spPr>
         <p:txBody>
           <a:bodyPr/>
           <a:lstStyle/>
           <a:p>
+            <a:r>
+              <a:rPr lang="en-US" dirty="0"/>
+              <a:t>About me.</a:t>
+            </a:r>
+          </a:p>
+        </p:txBody>
+      </p:sp>
+      <p:sp>
+        <p:nvSpPr>
+          <p:cNvPr id="2" name="Slide Number Placeholder 1">
+            <a:extLst>
+              <a:ext uri="{FF2B5EF4-FFF2-40B4-BE49-F238E27FC236}">
+                <a16:creationId xmlns:a16="http://schemas.microsoft.com/office/drawing/2014/main" id="{49B152A8-EF71-42D1-8DE2-D02867DCB6C7}"/>
+              </a:ext>
+            </a:extLst>
+          </p:cNvPr>
+          <p:cNvSpPr>
+            <a:spLocks noGrp="1"/>
+          </p:cNvSpPr>
+          <p:nvPr>
+            <p:ph type="sldNum" sz="quarter" idx="4294967295"/>
+          </p:nvPr>
+        </p:nvSpPr>
+        <p:spPr>
+          <a:xfrm>
+            <a:off x="11861800" y="6475413"/>
+            <a:ext cx="330200" cy="182562"/>
+          </a:xfrm>
+        </p:spPr>
+        <p:txBody>
+          <a:bodyPr/>
+          <a:lstStyle/>
+          <a:p>
             <a:fld id="{00E6A5BD-C011-4A45-AA3A-201790FB7F2B}" type="slidenum">
               <a:rPr lang="en-CA" smtClean="0"/>
-              <a:pPr/>
               <a:t>7</a:t>
             </a:fld>
             <a:endParaRPr lang="en-CA"/>
           </a:p>
         </p:txBody>
       </p:sp>
-      <p:sp>
-        <p:nvSpPr>
-          <p:cNvPr id="10" name="Rectangle 9">
+      <p:pic>
+        <p:nvPicPr>
+          <p:cNvPr id="8" name="Picture 7">
             <a:extLst>
               <a:ext uri="{FF2B5EF4-FFF2-40B4-BE49-F238E27FC236}">
-                <a16:creationId xmlns:a16="http://schemas.microsoft.com/office/drawing/2014/main" id="{0B067B62-D23E-864B-9E5B-4D924BB9B5A2}"/>
+                <a16:creationId xmlns:a16="http://schemas.microsoft.com/office/drawing/2014/main" id="{60C25D76-3984-4773-919B-E7693091EB22}"/>
               </a:ext>
             </a:extLst>
           </p:cNvPr>
-          <p:cNvSpPr/>
+          <p:cNvPicPr>
+            <a:picLocks noChangeAspect="1"/>
+          </p:cNvPicPr>
           <p:nvPr/>
-        </p:nvSpPr>
+        </p:nvPicPr>
+        <p:blipFill>
+          <a:blip r:embed="rId2">
+            <a:extLst>
+              <a:ext uri="{28A0092B-C50C-407E-A947-70E740481C1C}">
+                <a14:useLocalDpi xmlns:a14="http://schemas.microsoft.com/office/drawing/2010/main" val="0"/>
+              </a:ext>
+            </a:extLst>
+          </a:blip>
+          <a:stretch>
+            <a:fillRect/>
+          </a:stretch>
+        </p:blipFill>
         <p:spPr>
           <a:xfrm>
-            <a:off x="533767" y="863269"/>
-            <a:ext cx="11209867" cy="6247864"/>
+            <a:off x="8983416" y="2572124"/>
+            <a:ext cx="2385977" cy="2457844"/>
           </a:xfrm>
           <a:prstGeom prst="rect">
             <a:avLst/>
           </a:prstGeom>
         </p:spPr>
-        <p:txBody>
-          <a:bodyPr wrap="square">
+      </p:pic>
+      <p:sp>
+        <p:nvSpPr>
+          <p:cNvPr id="11" name="TextBox 10">
+            <a:extLst>
+              <a:ext uri="{FF2B5EF4-FFF2-40B4-BE49-F238E27FC236}">
+                <a16:creationId xmlns:a16="http://schemas.microsoft.com/office/drawing/2014/main" id="{00ECA2BE-B62B-4044-BCA6-2E786FB4F939}"/>
+              </a:ext>
+            </a:extLst>
+          </p:cNvPr>
+          <p:cNvSpPr txBox="1"/>
+          <p:nvPr/>
+        </p:nvSpPr>
+        <p:spPr>
+          <a:xfrm>
+            <a:off x="8597900" y="596572"/>
+            <a:ext cx="3429000" cy="1723549"/>
+          </a:xfrm>
+          <a:prstGeom prst="rect">
+            <a:avLst/>
+          </a:prstGeom>
+          <a:noFill/>
+        </p:spPr>
+        <p:txBody>
+          <a:bodyPr wrap="square" lIns="0" tIns="0" rIns="0" bIns="0" rtlCol="0">
             <a:spAutoFit/>
           </a:bodyPr>
           <a:lstStyle/>
           <a:p>
             <a:r>
-              <a:rPr lang="en-US" sz="4000" dirty="0"/>
-              <a:t>git clone </a:t>
-            </a:r>
-            <a:r>
-              <a:rPr lang="en-US" sz="4000" dirty="0">
-                <a:hlinkClick r:id="rId2"/>
+              <a:rPr lang="en-US" sz="2800" dirty="0">
+                <a:solidFill>
+                  <a:schemeClr val="accent2"/>
+                </a:solidFill>
               </a:rPr>
-              <a:t>https://github.com/pilotdeveloper/iot_lab.git</a:t>
-            </a:r>
-            <a:endParaRPr lang="en-US" sz="4000" dirty="0"/>
-          </a:p>
-          <a:p>
-            <a:endParaRPr lang="en-US" sz="4000" dirty="0"/>
-          </a:p>
-          <a:p>
-            <a:r>
-              <a:rPr lang="en-US" sz="4000" dirty="0"/>
-              <a:t>Mac users:  </a:t>
-            </a:r>
-          </a:p>
-          <a:p>
-            <a:br>
-              <a:rPr lang="en-US" sz="4000" dirty="0"/>
-            </a:br>
-            <a:r>
-              <a:rPr lang="en-US" sz="4000" dirty="0"/>
-              <a:t>Try this solution:</a:t>
-            </a:r>
-          </a:p>
-          <a:p>
-            <a:r>
-              <a:rPr lang="en-US" sz="4000" dirty="0">
-                <a:hlinkClick r:id="rId3"/>
-              </a:rPr>
-              <a:t>https://medium.com/@tony92151/arduino-ch340-chip-driver-for-high-sierra-39e621dae1e4</a:t>
-            </a:r>
-            <a:endParaRPr lang="en-US" sz="4000" dirty="0"/>
-          </a:p>
-          <a:p>
-            <a:endParaRPr lang="en-US" sz="4000" dirty="0"/>
-          </a:p>
-          <a:p>
-            <a:endParaRPr lang="en-US" sz="4000" dirty="0"/>
+              <a:t>2017 – Bachelors of Science in Computer Science, Georgia State University </a:t>
+            </a:r>
+          </a:p>
+        </p:txBody>
+      </p:sp>
+      <p:sp>
+        <p:nvSpPr>
+          <p:cNvPr id="5" name="Content Placeholder 4">
+            <a:extLst>
+              <a:ext uri="{FF2B5EF4-FFF2-40B4-BE49-F238E27FC236}">
+                <a16:creationId xmlns:a16="http://schemas.microsoft.com/office/drawing/2014/main" id="{4D39FF26-75C2-9749-87E3-0ECD136BF33E}"/>
+              </a:ext>
+            </a:extLst>
+          </p:cNvPr>
+          <p:cNvSpPr>
+            <a:spLocks noGrp="1"/>
+          </p:cNvSpPr>
+          <p:nvPr>
+            <p:ph idx="1"/>
+          </p:nvPr>
+        </p:nvSpPr>
+        <p:spPr>
+          <a:xfrm>
+            <a:off x="533400" y="1627634"/>
+            <a:ext cx="8049768" cy="4346825"/>
+          </a:xfrm>
+        </p:spPr>
+        <p:txBody>
+          <a:bodyPr/>
+          <a:lstStyle/>
+          <a:p>
+            <a:r>
+              <a:rPr lang="en-US" dirty="0"/>
+              <a:t>I have 2 AWS Associate Certifications</a:t>
+            </a:r>
+          </a:p>
+          <a:p>
+            <a:pPr lvl="1"/>
+            <a:r>
+              <a:rPr lang="en-US" dirty="0"/>
+              <a:t>	Developer</a:t>
+            </a:r>
+          </a:p>
+          <a:p>
+            <a:pPr lvl="1"/>
+            <a:r>
+              <a:rPr lang="en-US" dirty="0"/>
+              <a:t>	Solutions Architect</a:t>
+            </a:r>
+          </a:p>
+          <a:p>
+            <a:r>
+              <a:rPr lang="en-US" dirty="0"/>
+              <a:t>I’ve was a Teacher’s Assistant  for a Georgia Tech Bootcamp	2019	</a:t>
+            </a:r>
+          </a:p>
+          <a:p>
+            <a:r>
+              <a:rPr lang="en-US" dirty="0"/>
+              <a:t>Web Dev for Marta 2013 – 2014</a:t>
+            </a:r>
+          </a:p>
+          <a:p>
+            <a:pPr lvl="1"/>
+            <a:r>
+              <a:rPr lang="en-US" dirty="0"/>
+              <a:t>	Created the first version of the MARTA </a:t>
+            </a:r>
+          </a:p>
+          <a:p>
+            <a:pPr lvl="1"/>
+            <a:r>
+              <a:rPr lang="en-US" dirty="0"/>
+              <a:t>	on-the-go app for Android.</a:t>
+            </a:r>
           </a:p>
         </p:txBody>
       </p:sp>
     </p:spTree>
     <p:extLst>
       <p:ext uri="{BB962C8B-B14F-4D97-AF65-F5344CB8AC3E}">
-        <p14:creationId xmlns:p14="http://schemas.microsoft.com/office/powerpoint/2010/main" val="1449033653"/>
+        <p14:creationId xmlns:p14="http://schemas.microsoft.com/office/powerpoint/2010/main" val="3976485457"/>
       </p:ext>
     </p:extLst>
   </p:cSld>
@@ -9124,7 +9640,13 @@
       </p:grpSpPr>
       <p:sp>
         <p:nvSpPr>
-          <p:cNvPr id="2" name="Title 1"/>
+          <p:cNvPr id="3" name="Title 2">
+            <a:extLst>
+              <a:ext uri="{FF2B5EF4-FFF2-40B4-BE49-F238E27FC236}">
+                <a16:creationId xmlns:a16="http://schemas.microsoft.com/office/drawing/2014/main" id="{FDF58119-C7C8-4236-B437-7333A1D7FF5C}"/>
+              </a:ext>
+            </a:extLst>
+          </p:cNvPr>
           <p:cNvSpPr>
             <a:spLocks noGrp="1"/>
           </p:cNvSpPr>
@@ -9132,21 +9654,152 @@
             <p:ph type="title"/>
           </p:nvPr>
         </p:nvSpPr>
-        <p:spPr/>
+        <p:spPr>
+          <a:xfrm>
+            <a:off x="533400" y="222086"/>
+            <a:ext cx="10091484" cy="914400"/>
+          </a:xfrm>
+        </p:spPr>
         <p:txBody>
           <a:bodyPr/>
           <a:lstStyle/>
           <a:p>
             <a:r>
               <a:rPr lang="en-US" dirty="0"/>
-              <a:t>ENSURE YOUR BAG HAS</a:t>
-            </a:r>
-          </a:p>
-        </p:txBody>
-      </p:sp>
-      <p:sp>
-        <p:nvSpPr>
-          <p:cNvPr id="3" name="Content Placeholder 2"/>
+              <a:t>A little more about me.</a:t>
+            </a:r>
+          </a:p>
+        </p:txBody>
+      </p:sp>
+      <p:sp>
+        <p:nvSpPr>
+          <p:cNvPr id="2" name="Slide Number Placeholder 1">
+            <a:extLst>
+              <a:ext uri="{FF2B5EF4-FFF2-40B4-BE49-F238E27FC236}">
+                <a16:creationId xmlns:a16="http://schemas.microsoft.com/office/drawing/2014/main" id="{49B152A8-EF71-42D1-8DE2-D02867DCB6C7}"/>
+              </a:ext>
+            </a:extLst>
+          </p:cNvPr>
+          <p:cNvSpPr>
+            <a:spLocks noGrp="1"/>
+          </p:cNvSpPr>
+          <p:nvPr>
+            <p:ph type="sldNum" sz="quarter" idx="4294967295"/>
+          </p:nvPr>
+        </p:nvSpPr>
+        <p:spPr>
+          <a:xfrm>
+            <a:off x="11861800" y="6475413"/>
+            <a:ext cx="330200" cy="182562"/>
+          </a:xfrm>
+        </p:spPr>
+        <p:txBody>
+          <a:bodyPr/>
+          <a:lstStyle/>
+          <a:p>
+            <a:fld id="{00E6A5BD-C011-4A45-AA3A-201790FB7F2B}" type="slidenum">
+              <a:rPr lang="en-CA" smtClean="0"/>
+              <a:t>8</a:t>
+            </a:fld>
+            <a:endParaRPr lang="en-CA"/>
+          </a:p>
+        </p:txBody>
+      </p:sp>
+      <p:pic>
+        <p:nvPicPr>
+          <p:cNvPr id="8" name="Picture 7">
+            <a:extLst>
+              <a:ext uri="{FF2B5EF4-FFF2-40B4-BE49-F238E27FC236}">
+                <a16:creationId xmlns:a16="http://schemas.microsoft.com/office/drawing/2014/main" id="{60C25D76-3984-4773-919B-E7693091EB22}"/>
+              </a:ext>
+            </a:extLst>
+          </p:cNvPr>
+          <p:cNvPicPr>
+            <a:picLocks noChangeAspect="1"/>
+          </p:cNvPicPr>
+          <p:nvPr/>
+        </p:nvPicPr>
+        <p:blipFill>
+          <a:blip r:embed="rId2">
+            <a:extLst>
+              <a:ext uri="{28A0092B-C50C-407E-A947-70E740481C1C}">
+                <a14:useLocalDpi xmlns:a14="http://schemas.microsoft.com/office/drawing/2010/main" val="0"/>
+              </a:ext>
+            </a:extLst>
+          </a:blip>
+          <a:stretch>
+            <a:fillRect/>
+          </a:stretch>
+        </p:blipFill>
+        <p:spPr>
+          <a:xfrm>
+            <a:off x="8180832" y="1940944"/>
+            <a:ext cx="3846068" cy="1694056"/>
+          </a:xfrm>
+          <a:prstGeom prst="rect">
+            <a:avLst/>
+          </a:prstGeom>
+        </p:spPr>
+      </p:pic>
+      <p:sp>
+        <p:nvSpPr>
+          <p:cNvPr id="11" name="TextBox 10">
+            <a:extLst>
+              <a:ext uri="{FF2B5EF4-FFF2-40B4-BE49-F238E27FC236}">
+                <a16:creationId xmlns:a16="http://schemas.microsoft.com/office/drawing/2014/main" id="{00ECA2BE-B62B-4044-BCA6-2E786FB4F939}"/>
+              </a:ext>
+            </a:extLst>
+          </p:cNvPr>
+          <p:cNvSpPr txBox="1"/>
+          <p:nvPr/>
+        </p:nvSpPr>
+        <p:spPr>
+          <a:xfrm>
+            <a:off x="8180832" y="596572"/>
+            <a:ext cx="3846068" cy="1292662"/>
+          </a:xfrm>
+          <a:prstGeom prst="rect">
+            <a:avLst/>
+          </a:prstGeom>
+          <a:noFill/>
+        </p:spPr>
+        <p:txBody>
+          <a:bodyPr wrap="square" lIns="0" tIns="0" rIns="0" bIns="0" rtlCol="0">
+            <a:spAutoFit/>
+          </a:bodyPr>
+          <a:lstStyle/>
+          <a:p>
+            <a:pPr algn="ctr"/>
+            <a:r>
+              <a:rPr lang="en-US" sz="2800" b="1" dirty="0">
+                <a:solidFill>
+                  <a:schemeClr val="accent2"/>
+                </a:solidFill>
+              </a:rPr>
+              <a:t>Georgia Tech Bootcamp</a:t>
+            </a:r>
+          </a:p>
+          <a:p>
+            <a:r>
+              <a:rPr lang="en-US" sz="2800" dirty="0">
+                <a:solidFill>
+                  <a:schemeClr val="accent2"/>
+                </a:solidFill>
+              </a:rPr>
+              <a:t>2019 – Professional Education</a:t>
+            </a:r>
+          </a:p>
+        </p:txBody>
+      </p:sp>
+      <p:sp>
+        <p:nvSpPr>
+          <p:cNvPr id="5" name="Content Placeholder 4">
+            <a:extLst>
+              <a:ext uri="{FF2B5EF4-FFF2-40B4-BE49-F238E27FC236}">
+                <a16:creationId xmlns:a16="http://schemas.microsoft.com/office/drawing/2014/main" id="{4D39FF26-75C2-9749-87E3-0ECD136BF33E}"/>
+              </a:ext>
+            </a:extLst>
+          </p:cNvPr>
           <p:cNvSpPr>
             <a:spLocks noGrp="1"/>
           </p:cNvSpPr>
@@ -9156,8 +9809,8 @@
         </p:nvSpPr>
         <p:spPr>
           <a:xfrm>
-            <a:off x="533400" y="1136486"/>
-            <a:ext cx="10132616" cy="4837973"/>
+            <a:off x="533400" y="1627634"/>
+            <a:ext cx="8049768" cy="4346825"/>
           </a:xfrm>
         </p:spPr>
         <p:txBody>
@@ -9165,61 +9818,36 @@
           <a:lstStyle/>
           <a:p>
             <a:r>
-              <a:rPr lang="en-US" sz="2400" dirty="0"/>
-              <a:t>8 male to female jumper cables</a:t>
-            </a:r>
-          </a:p>
-          <a:p>
-            <a:r>
-              <a:rPr lang="en-US" sz="2400" dirty="0"/>
-              <a:t>10 male to male jumper cables</a:t>
-            </a:r>
-          </a:p>
-          <a:p>
-            <a:r>
-              <a:rPr lang="en-US" sz="2400" dirty="0"/>
-              <a:t>10 µf electrolytic capacitor</a:t>
-            </a:r>
-          </a:p>
-          <a:p>
-            <a:r>
-              <a:rPr lang="en-US" sz="2400" dirty="0"/>
-              <a:t>1x NRF24L01+ Transceiver</a:t>
-            </a:r>
-          </a:p>
-          <a:p>
-            <a:r>
-              <a:rPr lang="en-US" sz="2400" dirty="0"/>
-              <a:t>4 tactical buttons</a:t>
-            </a:r>
-          </a:p>
-          <a:p>
-            <a:r>
-              <a:rPr lang="en-US" sz="2400" dirty="0"/>
-              <a:t>Arduino</a:t>
-            </a:r>
-          </a:p>
-          <a:p>
-            <a:r>
-              <a:rPr lang="en-US" sz="2400" dirty="0"/>
-              <a:t>Breadboard</a:t>
-            </a:r>
-          </a:p>
-          <a:p>
-            <a:r>
-              <a:rPr lang="en-US" sz="2400" dirty="0"/>
-              <a:t>USB Cable</a:t>
-            </a:r>
-          </a:p>
-          <a:p>
-            <a:endParaRPr lang="en-US" sz="2400" dirty="0"/>
+              <a:rPr lang="en-US" dirty="0"/>
+              <a:t>I have 1 Full Stack Flex MERN Certifications </a:t>
+            </a:r>
+          </a:p>
+          <a:p>
+            <a:pPr lvl="1"/>
+            <a:r>
+              <a:rPr lang="en-US" dirty="0"/>
+              <a:t>	Georgia Tech University</a:t>
+            </a:r>
+          </a:p>
+          <a:p>
+            <a:r>
+              <a:rPr lang="en-US" dirty="0"/>
+              <a:t>Currently working on Cyber and Network Security Certifications</a:t>
+            </a:r>
+          </a:p>
+          <a:p>
+            <a:pPr lvl="1"/>
+            <a:r>
+              <a:rPr lang="en-US" dirty="0"/>
+              <a:t>	 Georgia Tech University / CompTIA Security+</a:t>
+            </a:r>
           </a:p>
         </p:txBody>
       </p:sp>
     </p:spTree>
     <p:extLst>
       <p:ext uri="{BB962C8B-B14F-4D97-AF65-F5344CB8AC3E}">
-        <p14:creationId xmlns:p14="http://schemas.microsoft.com/office/powerpoint/2010/main" val="1350419827"/>
+        <p14:creationId xmlns:p14="http://schemas.microsoft.com/office/powerpoint/2010/main" val="2628020600"/>
       </p:ext>
     </p:extLst>
   </p:cSld>
@@ -9248,122 +9876,41 @@
       </p:grpSpPr>
       <p:sp>
         <p:nvSpPr>
-          <p:cNvPr id="2" name="Title 1"/>
+          <p:cNvPr id="2" name="Title 1">
+            <a:extLst>
+              <a:ext uri="{FF2B5EF4-FFF2-40B4-BE49-F238E27FC236}">
+                <a16:creationId xmlns:a16="http://schemas.microsoft.com/office/drawing/2014/main" id="{4B12881A-54FE-4082-8082-7417F35AAC81}"/>
+              </a:ext>
+            </a:extLst>
+          </p:cNvPr>
           <p:cNvSpPr>
             <a:spLocks noGrp="1"/>
           </p:cNvSpPr>
           <p:nvPr>
-            <p:ph type="title"/>
+            <p:ph type="title" idx="4294967295"/>
           </p:nvPr>
         </p:nvSpPr>
-        <p:spPr/>
+        <p:spPr>
+          <a:xfrm>
+            <a:off x="5325035" y="860025"/>
+            <a:ext cx="10091738" cy="914400"/>
+          </a:xfrm>
+        </p:spPr>
         <p:txBody>
           <a:bodyPr/>
           <a:lstStyle/>
           <a:p>
             <a:r>
               <a:rPr lang="en-US" dirty="0"/>
-              <a:t>Test your board</a:t>
-            </a:r>
-          </a:p>
-        </p:txBody>
-      </p:sp>
-      <p:sp>
-        <p:nvSpPr>
-          <p:cNvPr id="3" name="Content Placeholder 2"/>
-          <p:cNvSpPr>
-            <a:spLocks noGrp="1"/>
-          </p:cNvSpPr>
-          <p:nvPr>
-            <p:ph idx="1"/>
-          </p:nvPr>
-        </p:nvSpPr>
-        <p:spPr/>
-        <p:txBody>
-          <a:bodyPr/>
-          <a:lstStyle/>
-          <a:p>
-            <a:r>
-              <a:rPr lang="en-US" sz="2400" dirty="0"/>
-              <a:t>Open the Arduino IDE</a:t>
-            </a:r>
-          </a:p>
-          <a:p>
-            <a:r>
-              <a:rPr lang="en-US" sz="2400" dirty="0"/>
-              <a:t>Select Tools, Click Board -&gt; Arduino Nano</a:t>
-            </a:r>
-          </a:p>
-          <a:p>
-            <a:r>
-              <a:rPr lang="en-US" sz="2400" dirty="0"/>
-              <a:t>Take note of the current devices under Tools -&gt; Port (write down so you don’t select them later)</a:t>
-            </a:r>
-          </a:p>
-          <a:p>
-            <a:r>
-              <a:rPr lang="en-US" sz="2400" dirty="0"/>
-              <a:t>Plug your Arduino in, wait about 20 seconds, and then check under Tools -&gt; Port.  </a:t>
-            </a:r>
-          </a:p>
-          <a:p>
-            <a:pPr marL="534924" lvl="3" indent="-342900"/>
-            <a:r>
-              <a:rPr lang="en-US" b="1" dirty="0"/>
-              <a:t>	</a:t>
-            </a:r>
-            <a:r>
-              <a:rPr lang="en-US" dirty="0"/>
-              <a:t>Windows – should show as a COM# device</a:t>
-            </a:r>
-          </a:p>
-          <a:p>
-            <a:pPr marL="534924" lvl="3" indent="-342900"/>
-            <a:r>
-              <a:rPr lang="en-US" dirty="0"/>
-              <a:t>	Mac Users – check the file called “</a:t>
-            </a:r>
-            <a:r>
-              <a:rPr lang="en-US" dirty="0" err="1"/>
-              <a:t>mac_help.txt</a:t>
-            </a:r>
-            <a:r>
-              <a:rPr lang="en-US" dirty="0"/>
-              <a:t>” in the repo.</a:t>
-            </a:r>
-          </a:p>
-          <a:p>
-            <a:r>
-              <a:rPr lang="en-US" sz="2400" dirty="0"/>
-              <a:t>Open the file </a:t>
-            </a:r>
-            <a:r>
-              <a:rPr lang="en-US" sz="2400" dirty="0" err="1"/>
-              <a:t>helloworld</a:t>
-            </a:r>
-            <a:r>
-              <a:rPr lang="en-US" sz="2400" dirty="0"/>
-              <a:t>/</a:t>
-            </a:r>
-            <a:r>
-              <a:rPr lang="en-US" sz="2400" dirty="0" err="1"/>
-              <a:t>helloworld.ino</a:t>
-            </a:r>
-            <a:r>
-              <a:rPr lang="en-US" sz="2400" dirty="0"/>
-              <a:t> and click the run button in Arduino</a:t>
-            </a:r>
-          </a:p>
-          <a:p>
-            <a:pPr lvl="1"/>
-            <a:endParaRPr lang="en-US" sz="2400" dirty="0"/>
+              <a:t>Current</a:t>
+            </a:r>
           </a:p>
         </p:txBody>
       </p:sp>
     </p:spTree>
     <p:extLst>
       <p:ext uri="{BB962C8B-B14F-4D97-AF65-F5344CB8AC3E}">
-        <p14:creationId xmlns:p14="http://schemas.microsoft.com/office/powerpoint/2010/main" val="2066430322"/>
+        <p14:creationId xmlns:p14="http://schemas.microsoft.com/office/powerpoint/2010/main" val="197253436"/>
       </p:ext>
     </p:extLst>
   </p:cSld>

</xml_diff>